<commit_message>
Updated pages for Student_questions.html
</commit_message>
<xml_diff>
--- a/COMP 3008 – Assignment 4.pptx
+++ b/COMP 3008 – Assignment 4.pptx
@@ -3367,41 +3367,53 @@
                   <a:schemeClr val="bg1"/>
                 </a:solidFill>
               </a:rPr>
-              <a:t>Provide </a:t>
-            </a:r>
+              <a:t>Provide an examination software geared to towards educational institutions</a:t>
+            </a:r>
+          </a:p>
+          <a:p>
             <a:r>
               <a:rPr lang="en-US" sz="2800" dirty="0" smtClean="0">
                 <a:solidFill>
                   <a:schemeClr val="bg1"/>
                 </a:solidFill>
               </a:rPr>
-              <a:t>an examination software geared to towards educational institutions</a:t>
-            </a:r>
-          </a:p>
-          <a:p>
+              <a:t>Students will us a tablet device </a:t>
+            </a:r>
+            <a:r>
+              <a:rPr lang="en-US" sz="2800" dirty="0" err="1" smtClean="0">
+                <a:solidFill>
+                  <a:schemeClr val="bg1"/>
+                </a:solidFill>
+              </a:rPr>
+              <a:t>iPad</a:t>
+            </a:r>
             <a:r>
               <a:rPr lang="en-US" sz="2800" dirty="0" smtClean="0">
                 <a:solidFill>
                   <a:schemeClr val="bg1"/>
                 </a:solidFill>
               </a:rPr>
-              <a:t>Students will us a tablet device </a:t>
-            </a:r>
-            <a:r>
-              <a:rPr lang="en-US" sz="2800" dirty="0" err="1" smtClean="0">
+              <a:t> or Android, to write their exam</a:t>
+            </a:r>
+          </a:p>
+          <a:p>
+            <a:r>
+              <a:rPr lang="en-US" sz="2800" dirty="0" smtClean="0">
                 <a:solidFill>
                   <a:schemeClr val="bg1"/>
                 </a:solidFill>
               </a:rPr>
-              <a:t>iPad</a:t>
-            </a:r>
+              <a:t>All exams will be done over a server where answers will be backed up and saved</a:t>
+            </a:r>
+          </a:p>
+          <a:p>
             <a:r>
               <a:rPr lang="en-US" sz="2800" dirty="0" smtClean="0">
                 <a:solidFill>
                   <a:schemeClr val="bg1"/>
                 </a:solidFill>
               </a:rPr>
-              <a:t> or Android, to write their exam</a:t>
+              <a:t>The system will also support digital marking where it can be done online</a:t>
             </a:r>
           </a:p>
           <a:p>
@@ -3411,40 +3423,7 @@
                   <a:schemeClr val="bg1"/>
                 </a:solidFill>
               </a:rPr>
-              <a:t>All exams will be done over a server where answers will be backed up and saved</a:t>
-            </a:r>
-          </a:p>
-          <a:p>
-            <a:r>
-              <a:rPr lang="en-US" sz="2800" dirty="0" smtClean="0">
-                <a:solidFill>
-                  <a:schemeClr val="bg1"/>
-                </a:solidFill>
-              </a:rPr>
-              <a:t>The system will also support digital marking where it can be done online</a:t>
-            </a:r>
-            <a:endParaRPr lang="en-US" sz="2800" dirty="0" smtClean="0">
-              <a:solidFill>
-                <a:schemeClr val="bg1"/>
-              </a:solidFill>
-            </a:endParaRPr>
-          </a:p>
-          <a:p>
-            <a:r>
-              <a:rPr lang="en-US" sz="2800" dirty="0" smtClean="0">
-                <a:solidFill>
-                  <a:schemeClr val="bg1"/>
-                </a:solidFill>
-              </a:rPr>
-              <a:t>Most importantly, prohibit </a:t>
-            </a:r>
-            <a:r>
-              <a:rPr lang="en-US" sz="2800" dirty="0" smtClean="0">
-                <a:solidFill>
-                  <a:schemeClr val="bg1"/>
-                </a:solidFill>
-              </a:rPr>
-              <a:t>the device from being used maliciously</a:t>
+              <a:t>Most importantly, prohibit the device from being used maliciously</a:t>
             </a:r>
           </a:p>
         </p:txBody>
@@ -4008,8 +3987,10 @@
                   </a:outerShdw>
                 </a:effectLst>
               </a:rPr>
-              <a:t>Short/Long </a:t>
-            </a:r>
+              <a:t>Short/Long answers</a:t>
+            </a:r>
+          </a:p>
+          <a:p>
             <a:r>
               <a:rPr lang="en-CA" sz="4800" b="1" dirty="0" smtClean="0">
                 <a:effectLst>
@@ -4020,43 +4001,8 @@
                   </a:outerShdw>
                 </a:effectLst>
               </a:rPr>
-              <a:t>answers</a:t>
-            </a:r>
-          </a:p>
-          <a:p>
-            <a:r>
-              <a:rPr lang="en-CA" sz="4800" b="1" dirty="0" smtClean="0">
-                <a:effectLst>
-                  <a:outerShdw blurRad="38100" dist="38100" dir="2700000" algn="tl">
-                    <a:srgbClr val="000000">
-                      <a:alpha val="43137"/>
-                    </a:srgbClr>
-                  </a:outerShdw>
-                </a:effectLst>
-              </a:rPr>
-              <a:t>Essay </a:t>
-            </a:r>
-            <a:r>
-              <a:rPr lang="en-CA" sz="4800" b="1" dirty="0" smtClean="0">
-                <a:effectLst>
-                  <a:outerShdw blurRad="38100" dist="38100" dir="2700000" algn="tl">
-                    <a:srgbClr val="000000">
-                      <a:alpha val="43137"/>
-                    </a:srgbClr>
-                  </a:outerShdw>
-                </a:effectLst>
-              </a:rPr>
-              <a:t>questions – Not unless a keyboard is provided</a:t>
-            </a:r>
-            <a:endParaRPr lang="en-CA" sz="4800" b="1" dirty="0" smtClean="0">
-              <a:effectLst>
-                <a:outerShdw blurRad="38100" dist="38100" dir="2700000" algn="tl">
-                  <a:srgbClr val="000000">
-                    <a:alpha val="43137"/>
-                  </a:srgbClr>
-                </a:outerShdw>
-              </a:effectLst>
-            </a:endParaRPr>
+              <a:t>Essay questions – Not unless a keyboard is provided</a:t>
+            </a:r>
           </a:p>
         </p:txBody>
       </p:sp>

</xml_diff>